<commit_message>
A few modifications to the presentation
</commit_message>
<xml_diff>
--- a/Privacy_Eye.pptx
+++ b/Privacy_Eye.pptx
@@ -5,19 +5,21 @@
     <p:sldMasterId id="2147483654" r:id="rId1"/>
   </p:sldMasterIdLst>
   <p:notesMasterIdLst>
-    <p:notesMasterId r:id="rId12"/>
+    <p:notesMasterId r:id="rId14"/>
   </p:notesMasterIdLst>
   <p:sldIdLst>
     <p:sldId id="256" r:id="rId2"/>
     <p:sldId id="516" r:id="rId3"/>
-    <p:sldId id="484" r:id="rId4"/>
-    <p:sldId id="518" r:id="rId5"/>
-    <p:sldId id="519" r:id="rId6"/>
-    <p:sldId id="521" r:id="rId7"/>
-    <p:sldId id="522" r:id="rId8"/>
-    <p:sldId id="523" r:id="rId9"/>
-    <p:sldId id="524" r:id="rId10"/>
-    <p:sldId id="520" r:id="rId11"/>
+    <p:sldId id="525" r:id="rId4"/>
+    <p:sldId id="484" r:id="rId5"/>
+    <p:sldId id="518" r:id="rId6"/>
+    <p:sldId id="519" r:id="rId7"/>
+    <p:sldId id="521" r:id="rId8"/>
+    <p:sldId id="522" r:id="rId9"/>
+    <p:sldId id="523" r:id="rId10"/>
+    <p:sldId id="524" r:id="rId11"/>
+    <p:sldId id="520" r:id="rId12"/>
+    <p:sldId id="526" r:id="rId13"/>
   </p:sldIdLst>
   <p:sldSz cx="9144000" cy="6858000" type="screen4x3"/>
   <p:notesSz cx="6858000" cy="9144000"/>
@@ -701,7 +703,219 @@
     </p:spTree>
     <p:extLst>
       <p:ext uri="{BB962C8B-B14F-4D97-AF65-F5344CB8AC3E}">
+        <p14:creationId xmlns:p14="http://schemas.microsoft.com/office/powerpoint/2010/main" val="3991933306"/>
+      </p:ext>
+    </p:extLst>
+  </p:cSld>
+  <p:clrMapOvr>
+    <a:masterClrMapping/>
+  </p:clrMapOvr>
+</p:notes>
+</file>
+
+<file path=ppt/notesSlides/notesSlide11.xml><?xml version="1.0" encoding="utf-8"?>
+<p:notes xmlns:a="http://schemas.openxmlformats.org/drawingml/2006/main" xmlns:r="http://schemas.openxmlformats.org/officeDocument/2006/relationships" xmlns:p="http://schemas.openxmlformats.org/presentationml/2006/main" showMasterSp="0" showMasterPhAnim="0">
+  <p:cSld>
+    <p:spTree>
+      <p:nvGrpSpPr>
+        <p:cNvPr id="1" name="Shape 42"/>
+        <p:cNvGrpSpPr/>
+        <p:nvPr/>
+      </p:nvGrpSpPr>
+      <p:grpSpPr>
+        <a:xfrm>
+          <a:off x="0" y="0"/>
+          <a:ext cx="0" cy="0"/>
+          <a:chOff x="0" y="0"/>
+          <a:chExt cx="0" cy="0"/>
+        </a:xfrm>
+      </p:grpSpPr>
+      <p:sp>
+        <p:nvSpPr>
+          <p:cNvPr id="43" name="Shape 43"/>
+          <p:cNvSpPr>
+            <a:spLocks noGrp="1" noRot="1" noChangeAspect="1"/>
+          </p:cNvSpPr>
+          <p:nvPr>
+            <p:ph type="sldImg" idx="2"/>
+          </p:nvPr>
+        </p:nvSpPr>
+        <p:spPr>
+          <a:xfrm>
+            <a:off x="1143000" y="685800"/>
+            <a:ext cx="4572000" cy="3429000"/>
+          </a:xfrm>
+          <a:custGeom>
+            <a:avLst/>
+            <a:gdLst/>
+            <a:ahLst/>
+            <a:cxnLst/>
+            <a:rect l="0" t="0" r="0" b="0"/>
+            <a:pathLst>
+              <a:path w="120000" h="120000" extrusionOk="0">
+                <a:moveTo>
+                  <a:pt x="0" y="0"/>
+                </a:moveTo>
+                <a:lnTo>
+                  <a:pt x="120000" y="0"/>
+                </a:lnTo>
+                <a:lnTo>
+                  <a:pt x="120000" y="120000"/>
+                </a:lnTo>
+                <a:lnTo>
+                  <a:pt x="0" y="120000"/>
+                </a:lnTo>
+                <a:close/>
+              </a:path>
+            </a:pathLst>
+          </a:custGeom>
+        </p:spPr>
+      </p:sp>
+      <p:sp>
+        <p:nvSpPr>
+          <p:cNvPr id="44" name="Shape 44"/>
+          <p:cNvSpPr txBox="1">
+            <a:spLocks noGrp="1"/>
+          </p:cNvSpPr>
+          <p:nvPr>
+            <p:ph type="body" idx="1"/>
+          </p:nvPr>
+        </p:nvSpPr>
+        <p:spPr>
+          <a:xfrm>
+            <a:off x="685800" y="4343400"/>
+            <a:ext cx="5486399" cy="4114800"/>
+          </a:xfrm>
+          <a:prstGeom prst="rect">
+            <a:avLst/>
+          </a:prstGeom>
+        </p:spPr>
+        <p:txBody>
+          <a:bodyPr lIns="91425" tIns="91425" rIns="91425" bIns="91425" anchor="t" anchorCtr="0">
+            <a:noAutofit/>
+          </a:bodyPr>
+          <a:lstStyle/>
+          <a:p>
+            <a:pPr lvl="0">
+              <a:spcBef>
+                <a:spcPts val="0"/>
+              </a:spcBef>
+              <a:buNone/>
+            </a:pPr>
+            <a:endParaRPr/>
+          </a:p>
+        </p:txBody>
+      </p:sp>
+    </p:spTree>
+    <p:extLst>
+      <p:ext uri="{BB962C8B-B14F-4D97-AF65-F5344CB8AC3E}">
         <p14:creationId xmlns:p14="http://schemas.microsoft.com/office/powerpoint/2010/main" val="241192079"/>
+      </p:ext>
+    </p:extLst>
+  </p:cSld>
+  <p:clrMapOvr>
+    <a:masterClrMapping/>
+  </p:clrMapOvr>
+</p:notes>
+</file>
+
+<file path=ppt/notesSlides/notesSlide12.xml><?xml version="1.0" encoding="utf-8"?>
+<p:notes xmlns:a="http://schemas.openxmlformats.org/drawingml/2006/main" xmlns:r="http://schemas.openxmlformats.org/officeDocument/2006/relationships" xmlns:p="http://schemas.openxmlformats.org/presentationml/2006/main" showMasterSp="0" showMasterPhAnim="0">
+  <p:cSld>
+    <p:spTree>
+      <p:nvGrpSpPr>
+        <p:cNvPr id="1" name="Shape 42"/>
+        <p:cNvGrpSpPr/>
+        <p:nvPr/>
+      </p:nvGrpSpPr>
+      <p:grpSpPr>
+        <a:xfrm>
+          <a:off x="0" y="0"/>
+          <a:ext cx="0" cy="0"/>
+          <a:chOff x="0" y="0"/>
+          <a:chExt cx="0" cy="0"/>
+        </a:xfrm>
+      </p:grpSpPr>
+      <p:sp>
+        <p:nvSpPr>
+          <p:cNvPr id="43" name="Shape 43"/>
+          <p:cNvSpPr>
+            <a:spLocks noGrp="1" noRot="1" noChangeAspect="1"/>
+          </p:cNvSpPr>
+          <p:nvPr>
+            <p:ph type="sldImg" idx="2"/>
+          </p:nvPr>
+        </p:nvSpPr>
+        <p:spPr>
+          <a:xfrm>
+            <a:off x="1143000" y="685800"/>
+            <a:ext cx="4572000" cy="3429000"/>
+          </a:xfrm>
+          <a:custGeom>
+            <a:avLst/>
+            <a:gdLst/>
+            <a:ahLst/>
+            <a:cxnLst/>
+            <a:rect l="0" t="0" r="0" b="0"/>
+            <a:pathLst>
+              <a:path w="120000" h="120000" extrusionOk="0">
+                <a:moveTo>
+                  <a:pt x="0" y="0"/>
+                </a:moveTo>
+                <a:lnTo>
+                  <a:pt x="120000" y="0"/>
+                </a:lnTo>
+                <a:lnTo>
+                  <a:pt x="120000" y="120000"/>
+                </a:lnTo>
+                <a:lnTo>
+                  <a:pt x="0" y="120000"/>
+                </a:lnTo>
+                <a:close/>
+              </a:path>
+            </a:pathLst>
+          </a:custGeom>
+        </p:spPr>
+      </p:sp>
+      <p:sp>
+        <p:nvSpPr>
+          <p:cNvPr id="44" name="Shape 44"/>
+          <p:cNvSpPr txBox="1">
+            <a:spLocks noGrp="1"/>
+          </p:cNvSpPr>
+          <p:nvPr>
+            <p:ph type="body" idx="1"/>
+          </p:nvPr>
+        </p:nvSpPr>
+        <p:spPr>
+          <a:xfrm>
+            <a:off x="685800" y="4343400"/>
+            <a:ext cx="5486399" cy="4114800"/>
+          </a:xfrm>
+          <a:prstGeom prst="rect">
+            <a:avLst/>
+          </a:prstGeom>
+        </p:spPr>
+        <p:txBody>
+          <a:bodyPr lIns="91425" tIns="91425" rIns="91425" bIns="91425" anchor="t" anchorCtr="0">
+            <a:noAutofit/>
+          </a:bodyPr>
+          <a:lstStyle/>
+          <a:p>
+            <a:pPr lvl="0">
+              <a:spcBef>
+                <a:spcPts val="0"/>
+              </a:spcBef>
+              <a:buNone/>
+            </a:pPr>
+            <a:endParaRPr/>
+          </a:p>
+        </p:txBody>
+      </p:sp>
+    </p:spTree>
+    <p:extLst>
+      <p:ext uri="{BB962C8B-B14F-4D97-AF65-F5344CB8AC3E}">
+        <p14:creationId xmlns:p14="http://schemas.microsoft.com/office/powerpoint/2010/main" val="2053381594"/>
       </p:ext>
     </p:extLst>
   </p:cSld>
@@ -822,7 +1036,7 @@
   <p:cSld>
     <p:spTree>
       <p:nvGrpSpPr>
-        <p:cNvPr id="1" name="Shape 42"/>
+        <p:cNvPr id="1" name="Shape 23"/>
         <p:cNvGrpSpPr/>
         <p:nvPr/>
       </p:nvGrpSpPr>
@@ -836,7 +1050,7 @@
       </p:grpSpPr>
       <p:sp>
         <p:nvSpPr>
-          <p:cNvPr id="43" name="Shape 43"/>
+          <p:cNvPr id="24" name="Shape 24"/>
           <p:cNvSpPr>
             <a:spLocks noGrp="1" noRot="1" noChangeAspect="1"/>
           </p:cNvSpPr>
@@ -877,7 +1091,7 @@
       </p:sp>
       <p:sp>
         <p:nvSpPr>
-          <p:cNvPr id="44" name="Shape 44"/>
+          <p:cNvPr id="25" name="Shape 25"/>
           <p:cNvSpPr txBox="1">
             <a:spLocks noGrp="1"/>
           </p:cNvSpPr>
@@ -906,14 +1120,14 @@
               </a:spcBef>
               <a:buNone/>
             </a:pPr>
-            <a:endParaRPr/>
+            <a:endParaRPr dirty="0"/>
           </a:p>
         </p:txBody>
       </p:sp>
     </p:spTree>
     <p:extLst>
       <p:ext uri="{BB962C8B-B14F-4D97-AF65-F5344CB8AC3E}">
-        <p14:creationId xmlns:p14="http://schemas.microsoft.com/office/powerpoint/2010/main" val="871214637"/>
+        <p14:creationId xmlns:p14="http://schemas.microsoft.com/office/powerpoint/2010/main" val="1345618773"/>
       </p:ext>
     </p:extLst>
   </p:cSld>
@@ -1019,7 +1233,7 @@
     </p:spTree>
     <p:extLst>
       <p:ext uri="{BB962C8B-B14F-4D97-AF65-F5344CB8AC3E}">
-        <p14:creationId xmlns:p14="http://schemas.microsoft.com/office/powerpoint/2010/main" val="3202288822"/>
+        <p14:creationId xmlns:p14="http://schemas.microsoft.com/office/powerpoint/2010/main" val="871214637"/>
       </p:ext>
     </p:extLst>
   </p:cSld>
@@ -1125,7 +1339,7 @@
     </p:spTree>
     <p:extLst>
       <p:ext uri="{BB962C8B-B14F-4D97-AF65-F5344CB8AC3E}">
-        <p14:creationId xmlns:p14="http://schemas.microsoft.com/office/powerpoint/2010/main" val="71717218"/>
+        <p14:creationId xmlns:p14="http://schemas.microsoft.com/office/powerpoint/2010/main" val="3202288822"/>
       </p:ext>
     </p:extLst>
   </p:cSld>
@@ -1231,7 +1445,7 @@
     </p:spTree>
     <p:extLst>
       <p:ext uri="{BB962C8B-B14F-4D97-AF65-F5344CB8AC3E}">
-        <p14:creationId xmlns:p14="http://schemas.microsoft.com/office/powerpoint/2010/main" val="1884876774"/>
+        <p14:creationId xmlns:p14="http://schemas.microsoft.com/office/powerpoint/2010/main" val="71717218"/>
       </p:ext>
     </p:extLst>
   </p:cSld>
@@ -1337,7 +1551,7 @@
     </p:spTree>
     <p:extLst>
       <p:ext uri="{BB962C8B-B14F-4D97-AF65-F5344CB8AC3E}">
-        <p14:creationId xmlns:p14="http://schemas.microsoft.com/office/powerpoint/2010/main" val="1897877990"/>
+        <p14:creationId xmlns:p14="http://schemas.microsoft.com/office/powerpoint/2010/main" val="1884876774"/>
       </p:ext>
     </p:extLst>
   </p:cSld>
@@ -1443,7 +1657,7 @@
     </p:spTree>
     <p:extLst>
       <p:ext uri="{BB962C8B-B14F-4D97-AF65-F5344CB8AC3E}">
-        <p14:creationId xmlns:p14="http://schemas.microsoft.com/office/powerpoint/2010/main" val="64917583"/>
+        <p14:creationId xmlns:p14="http://schemas.microsoft.com/office/powerpoint/2010/main" val="1897877990"/>
       </p:ext>
     </p:extLst>
   </p:cSld>
@@ -1549,7 +1763,7 @@
     </p:spTree>
     <p:extLst>
       <p:ext uri="{BB962C8B-B14F-4D97-AF65-F5344CB8AC3E}">
-        <p14:creationId xmlns:p14="http://schemas.microsoft.com/office/powerpoint/2010/main" val="3991933306"/>
+        <p14:creationId xmlns:p14="http://schemas.microsoft.com/office/powerpoint/2010/main" val="64917583"/>
       </p:ext>
     </p:extLst>
   </p:cSld>
@@ -3973,7 +4187,7 @@
         </p:blipFill>
         <p:spPr>
           <a:xfrm>
-            <a:off x="1790700" y="2152650"/>
+            <a:off x="1790700" y="2016020"/>
             <a:ext cx="5562600" cy="2552700"/>
           </a:xfrm>
           <a:prstGeom prst="rect">
@@ -4008,6 +4222,381 @@
       </p:grpSpPr>
       <p:sp>
         <p:nvSpPr>
+          <p:cNvPr id="7" name="Shape 47">
+            <a:extLst>
+              <a:ext uri="{FF2B5EF4-FFF2-40B4-BE49-F238E27FC236}">
+                <a16:creationId xmlns:a16="http://schemas.microsoft.com/office/drawing/2014/main" id="{562FAEF3-33AD-F840-9F7F-A5E52FA0E812}"/>
+              </a:ext>
+            </a:extLst>
+          </p:cNvPr>
+          <p:cNvSpPr txBox="1">
+            <a:spLocks/>
+          </p:cNvSpPr>
+          <p:nvPr/>
+        </p:nvSpPr>
+        <p:spPr>
+          <a:xfrm>
+            <a:off x="457200" y="891251"/>
+            <a:ext cx="8229600" cy="5676650"/>
+          </a:xfrm>
+          <a:prstGeom prst="rect">
+            <a:avLst/>
+          </a:prstGeom>
+          <a:noFill/>
+          <a:ln>
+            <a:noFill/>
+          </a:ln>
+        </p:spPr>
+        <p:txBody>
+          <a:bodyPr lIns="91425" tIns="91425" rIns="91425" bIns="91425" anchor="t" anchorCtr="0">
+            <a:normAutofit/>
+          </a:bodyPr>
+          <a:lstStyle>
+            <a:defPPr marR="0" lvl="0" algn="l" rtl="0">
+              <a:lnSpc>
+                <a:spcPct val="100000"/>
+              </a:lnSpc>
+              <a:spcBef>
+                <a:spcPts val="0"/>
+              </a:spcBef>
+              <a:spcAft>
+                <a:spcPts val="0"/>
+              </a:spcAft>
+            </a:defPPr>
+            <a:lvl1pPr marR="0" lvl="0" algn="l" rtl="0">
+              <a:lnSpc>
+                <a:spcPct val="100000"/>
+              </a:lnSpc>
+              <a:spcBef>
+                <a:spcPts val="0"/>
+              </a:spcBef>
+              <a:spcAft>
+                <a:spcPts val="0"/>
+              </a:spcAft>
+              <a:buClr>
+                <a:schemeClr val="lt1"/>
+              </a:buClr>
+              <a:buSzPct val="100000"/>
+              <a:buFont typeface="Arial"/>
+              <a:buChar char="●"/>
+              <a:defRPr sz="3000" b="0" i="0" u="none" strike="noStrike" cap="none">
+                <a:solidFill>
+                  <a:schemeClr val="lt1"/>
+                </a:solidFill>
+                <a:latin typeface="Arial"/>
+                <a:ea typeface="Arial"/>
+                <a:cs typeface="Arial"/>
+                <a:sym typeface="Arial"/>
+              </a:defRPr>
+            </a:lvl1pPr>
+            <a:lvl2pPr marR="0" lvl="1" algn="l" rtl="0">
+              <a:lnSpc>
+                <a:spcPct val="100000"/>
+              </a:lnSpc>
+              <a:spcBef>
+                <a:spcPts val="0"/>
+              </a:spcBef>
+              <a:spcAft>
+                <a:spcPts val="0"/>
+              </a:spcAft>
+              <a:buClr>
+                <a:schemeClr val="lt1"/>
+              </a:buClr>
+              <a:buSzPct val="100000"/>
+              <a:buFont typeface="Courier New"/>
+              <a:buChar char="o"/>
+              <a:defRPr sz="2400" b="0" i="0" u="none" strike="noStrike" cap="none">
+                <a:solidFill>
+                  <a:schemeClr val="lt1"/>
+                </a:solidFill>
+                <a:latin typeface="Arial"/>
+                <a:ea typeface="Arial"/>
+                <a:cs typeface="Arial"/>
+                <a:sym typeface="Arial"/>
+              </a:defRPr>
+            </a:lvl2pPr>
+            <a:lvl3pPr marR="0" lvl="2" algn="l" rtl="0">
+              <a:lnSpc>
+                <a:spcPct val="100000"/>
+              </a:lnSpc>
+              <a:spcBef>
+                <a:spcPts val="0"/>
+              </a:spcBef>
+              <a:spcAft>
+                <a:spcPts val="0"/>
+              </a:spcAft>
+              <a:buClr>
+                <a:schemeClr val="lt1"/>
+              </a:buClr>
+              <a:buSzPct val="100000"/>
+              <a:buFont typeface="Wingdings"/>
+              <a:buChar char="§"/>
+              <a:defRPr sz="2400" b="0" i="0" u="none" strike="noStrike" cap="none">
+                <a:solidFill>
+                  <a:schemeClr val="lt1"/>
+                </a:solidFill>
+                <a:latin typeface="Arial"/>
+                <a:ea typeface="Arial"/>
+                <a:cs typeface="Arial"/>
+                <a:sym typeface="Arial"/>
+              </a:defRPr>
+            </a:lvl3pPr>
+            <a:lvl4pPr marR="0" lvl="3" algn="l" rtl="0">
+              <a:lnSpc>
+                <a:spcPct val="100000"/>
+              </a:lnSpc>
+              <a:spcBef>
+                <a:spcPts val="0"/>
+              </a:spcBef>
+              <a:spcAft>
+                <a:spcPts val="0"/>
+              </a:spcAft>
+              <a:buClr>
+                <a:schemeClr val="lt1"/>
+              </a:buClr>
+              <a:buSzPct val="100000"/>
+              <a:buFont typeface="Arial"/>
+              <a:buChar char="●"/>
+              <a:defRPr sz="1800" b="0" i="0" u="none" strike="noStrike" cap="none">
+                <a:solidFill>
+                  <a:schemeClr val="lt1"/>
+                </a:solidFill>
+                <a:latin typeface="Arial"/>
+                <a:ea typeface="Arial"/>
+                <a:cs typeface="Arial"/>
+                <a:sym typeface="Arial"/>
+              </a:defRPr>
+            </a:lvl4pPr>
+            <a:lvl5pPr marR="0" lvl="4" algn="l" rtl="0">
+              <a:lnSpc>
+                <a:spcPct val="100000"/>
+              </a:lnSpc>
+              <a:spcBef>
+                <a:spcPts val="0"/>
+              </a:spcBef>
+              <a:spcAft>
+                <a:spcPts val="0"/>
+              </a:spcAft>
+              <a:buClr>
+                <a:schemeClr val="lt1"/>
+              </a:buClr>
+              <a:buSzPct val="100000"/>
+              <a:buFont typeface="Courier New"/>
+              <a:buChar char="o"/>
+              <a:defRPr sz="1800" b="0" i="0" u="none" strike="noStrike" cap="none">
+                <a:solidFill>
+                  <a:schemeClr val="lt1"/>
+                </a:solidFill>
+                <a:latin typeface="Arial"/>
+                <a:ea typeface="Arial"/>
+                <a:cs typeface="Arial"/>
+                <a:sym typeface="Arial"/>
+              </a:defRPr>
+            </a:lvl5pPr>
+            <a:lvl6pPr marR="0" lvl="5" algn="l" rtl="0">
+              <a:lnSpc>
+                <a:spcPct val="100000"/>
+              </a:lnSpc>
+              <a:spcBef>
+                <a:spcPts val="0"/>
+              </a:spcBef>
+              <a:spcAft>
+                <a:spcPts val="0"/>
+              </a:spcAft>
+              <a:buClr>
+                <a:schemeClr val="lt1"/>
+              </a:buClr>
+              <a:buSzPct val="100000"/>
+              <a:buFont typeface="Wingdings"/>
+              <a:buChar char="§"/>
+              <a:defRPr sz="1800" b="0" i="0" u="none" strike="noStrike" cap="none">
+                <a:solidFill>
+                  <a:schemeClr val="lt1"/>
+                </a:solidFill>
+                <a:latin typeface="Arial"/>
+                <a:ea typeface="Arial"/>
+                <a:cs typeface="Arial"/>
+                <a:sym typeface="Arial"/>
+              </a:defRPr>
+            </a:lvl6pPr>
+            <a:lvl7pPr marR="0" lvl="6" algn="l" rtl="0">
+              <a:lnSpc>
+                <a:spcPct val="100000"/>
+              </a:lnSpc>
+              <a:spcBef>
+                <a:spcPts val="0"/>
+              </a:spcBef>
+              <a:spcAft>
+                <a:spcPts val="0"/>
+              </a:spcAft>
+              <a:buClr>
+                <a:schemeClr val="lt1"/>
+              </a:buClr>
+              <a:buSzPct val="100000"/>
+              <a:buFont typeface="Arial"/>
+              <a:buChar char="●"/>
+              <a:defRPr sz="1800" b="0" i="0" u="none" strike="noStrike" cap="none">
+                <a:solidFill>
+                  <a:schemeClr val="lt1"/>
+                </a:solidFill>
+                <a:latin typeface="Arial"/>
+                <a:ea typeface="Arial"/>
+                <a:cs typeface="Arial"/>
+                <a:sym typeface="Arial"/>
+              </a:defRPr>
+            </a:lvl7pPr>
+            <a:lvl8pPr marR="0" lvl="7" algn="l" rtl="0">
+              <a:lnSpc>
+                <a:spcPct val="100000"/>
+              </a:lnSpc>
+              <a:spcBef>
+                <a:spcPts val="0"/>
+              </a:spcBef>
+              <a:spcAft>
+                <a:spcPts val="0"/>
+              </a:spcAft>
+              <a:buClr>
+                <a:schemeClr val="lt1"/>
+              </a:buClr>
+              <a:buSzPct val="100000"/>
+              <a:buFont typeface="Courier New"/>
+              <a:buChar char="o"/>
+              <a:defRPr sz="1800" b="0" i="0" u="none" strike="noStrike" cap="none">
+                <a:solidFill>
+                  <a:schemeClr val="lt1"/>
+                </a:solidFill>
+                <a:latin typeface="Arial"/>
+                <a:ea typeface="Arial"/>
+                <a:cs typeface="Arial"/>
+                <a:sym typeface="Arial"/>
+              </a:defRPr>
+            </a:lvl8pPr>
+            <a:lvl9pPr marR="0" lvl="8" algn="l" rtl="0">
+              <a:lnSpc>
+                <a:spcPct val="100000"/>
+              </a:lnSpc>
+              <a:spcBef>
+                <a:spcPts val="0"/>
+              </a:spcBef>
+              <a:spcAft>
+                <a:spcPts val="0"/>
+              </a:spcAft>
+              <a:buClr>
+                <a:schemeClr val="lt1"/>
+              </a:buClr>
+              <a:buSzPct val="100000"/>
+              <a:buFont typeface="Wingdings"/>
+              <a:buChar char="§"/>
+              <a:defRPr sz="1800" b="0" i="0" u="none" strike="noStrike" cap="none">
+                <a:solidFill>
+                  <a:schemeClr val="lt1"/>
+                </a:solidFill>
+                <a:latin typeface="Arial"/>
+                <a:ea typeface="Arial"/>
+                <a:cs typeface="Arial"/>
+                <a:sym typeface="Arial"/>
+              </a:defRPr>
+            </a:lvl9pPr>
+          </a:lstStyle>
+          <a:p>
+            <a:pPr>
+              <a:buNone/>
+            </a:pPr>
+            <a:endParaRPr lang="en-US" sz="2800" dirty="0"/>
+          </a:p>
+          <a:p>
+            <a:pPr marL="457200" indent="-457200">
+              <a:buFont typeface="Wingdings" pitchFamily="2" charset="2"/>
+              <a:buChar char="Ø"/>
+            </a:pPr>
+            <a:r>
+              <a:rPr lang="en-US" sz="2800" dirty="0"/>
+              <a:t>Face detection to identify if intrusion happened.</a:t>
+            </a:r>
+          </a:p>
+          <a:p>
+            <a:pPr marL="457200" indent="-457200">
+              <a:buFont typeface="Wingdings" pitchFamily="2" charset="2"/>
+              <a:buChar char="Ø"/>
+            </a:pPr>
+            <a:endParaRPr lang="en-US" sz="2800" dirty="0"/>
+          </a:p>
+          <a:p>
+            <a:pPr marL="457200" indent="-457200">
+              <a:buFont typeface="Wingdings" pitchFamily="2" charset="2"/>
+              <a:buChar char="Ø"/>
+            </a:pPr>
+            <a:r>
+              <a:rPr lang="en-US" sz="2800" dirty="0"/>
+              <a:t>Once Face is detected, then Face is recognized using machine learning models and then classified to see if it matches SIMILAR Faces on pre-trained models. If a match is found, it does NOT Alert.</a:t>
+            </a:r>
+          </a:p>
+          <a:p>
+            <a:pPr>
+              <a:buNone/>
+            </a:pPr>
+            <a:r>
+              <a:rPr lang="en-US" sz="2800" dirty="0"/>
+              <a:t> </a:t>
+            </a:r>
+          </a:p>
+          <a:p>
+            <a:pPr marL="457200" indent="-457200">
+              <a:buFont typeface="Wingdings" pitchFamily="2" charset="2"/>
+              <a:buChar char="Ø"/>
+            </a:pPr>
+            <a:r>
+              <a:rPr lang="en-US" sz="2800" dirty="0"/>
+              <a:t>If match is NOT found, raises intrusion alert.</a:t>
+            </a:r>
+          </a:p>
+          <a:p>
+            <a:pPr marL="457200" indent="-457200">
+              <a:buFont typeface="Wingdings" pitchFamily="2" charset="2"/>
+              <a:buChar char="Ø"/>
+            </a:pPr>
+            <a:endParaRPr lang="en-US" sz="2800" dirty="0"/>
+          </a:p>
+          <a:p>
+            <a:pPr>
+              <a:buNone/>
+            </a:pPr>
+            <a:endParaRPr lang="en-US" sz="2800" dirty="0"/>
+          </a:p>
+        </p:txBody>
+      </p:sp>
+    </p:spTree>
+    <p:extLst>
+      <p:ext uri="{BB962C8B-B14F-4D97-AF65-F5344CB8AC3E}">
+        <p14:creationId xmlns:p14="http://schemas.microsoft.com/office/powerpoint/2010/main" val="1037662198"/>
+      </p:ext>
+    </p:extLst>
+  </p:cSld>
+  <p:clrMapOvr>
+    <a:masterClrMapping/>
+  </p:clrMapOvr>
+</p:sld>
+</file>
+
+<file path=ppt/slides/slide11.xml><?xml version="1.0" encoding="utf-8"?>
+<p:sld xmlns:a="http://schemas.openxmlformats.org/drawingml/2006/main" xmlns:r="http://schemas.openxmlformats.org/officeDocument/2006/relationships" xmlns:p="http://schemas.openxmlformats.org/presentationml/2006/main">
+  <p:cSld>
+    <p:spTree>
+      <p:nvGrpSpPr>
+        <p:cNvPr id="1" name="Shape 45"/>
+        <p:cNvGrpSpPr/>
+        <p:nvPr/>
+      </p:nvGrpSpPr>
+      <p:grpSpPr>
+        <a:xfrm>
+          <a:off x="0" y="0"/>
+          <a:ext cx="0" cy="0"/>
+          <a:chOff x="0" y="0"/>
+          <a:chExt cx="0" cy="0"/>
+        </a:xfrm>
+      </p:grpSpPr>
+      <p:sp>
+        <p:nvSpPr>
           <p:cNvPr id="47" name="Shape 47"/>
           <p:cNvSpPr txBox="1">
             <a:spLocks noGrp="1"/>
@@ -4018,7 +4607,7 @@
         </p:nvSpPr>
         <p:spPr>
           <a:xfrm>
-            <a:off x="457200" y="891251"/>
+            <a:off x="457200" y="590675"/>
             <a:ext cx="8229600" cy="5676650"/>
           </a:xfrm>
           <a:prstGeom prst="rect">
@@ -4028,7 +4617,7 @@
         </p:spPr>
         <p:txBody>
           <a:bodyPr lIns="91425" tIns="91425" rIns="91425" bIns="91425" anchor="t" anchorCtr="0">
-            <a:normAutofit lnSpcReduction="10000"/>
+            <a:normAutofit/>
           </a:bodyPr>
           <a:lstStyle/>
           <a:p>
@@ -4036,7 +4625,7 @@
               <a:buNone/>
             </a:pPr>
             <a:r>
-              <a:rPr lang="en" sz="2800" dirty="0"/>
+              <a:rPr lang="en" sz="3600" b="1" dirty="0"/>
               <a:t>Future Plans:</a:t>
             </a:r>
           </a:p>
@@ -4052,7 +4641,7 @@
             </a:pPr>
             <a:r>
               <a:rPr lang="en" sz="2800" dirty="0"/>
-              <a:t>Extend this idea to mobile devices </a:t>
+              <a:t>Extend this idea to mobile devices and can be added as an accessibility feature on mobile phones.</a:t>
             </a:r>
           </a:p>
           <a:p>
@@ -4067,30 +4656,7 @@
             </a:pPr>
             <a:r>
               <a:rPr lang="en" sz="2800" dirty="0"/>
-              <a:t>This can be added as an accessibility feature on mobile phones</a:t>
-            </a:r>
-          </a:p>
-          <a:p>
-            <a:pPr marL="514350" indent="-514350">
-              <a:buAutoNum type="arabicPeriod"/>
-            </a:pPr>
-            <a:endParaRPr lang="en" sz="2800" dirty="0"/>
-          </a:p>
-          <a:p>
-            <a:pPr marL="514350" indent="-514350">
-              <a:buAutoNum type="arabicPeriod"/>
-            </a:pPr>
-            <a:r>
-              <a:rPr lang="en" sz="2800" dirty="0"/>
-              <a:t>If a user’s location is detected in public zone or user is continuously moving (</a:t>
-            </a:r>
-            <a:r>
-              <a:rPr lang="en" sz="2800" dirty="0" err="1"/>
-              <a:t>e.g</a:t>
-            </a:r>
-            <a:r>
-              <a:rPr lang="en" sz="2800" dirty="0"/>
-              <a:t> in bus), remind him if he would like to be monitored. </a:t>
+              <a:t>If a user’s location is detected in public zone or user is continuously moving (e.g. in bus), alert him if he would like to be monitored. </a:t>
             </a:r>
           </a:p>
           <a:p>
@@ -4114,6 +4680,143 @@
     <p:extLst>
       <p:ext uri="{BB962C8B-B14F-4D97-AF65-F5344CB8AC3E}">
         <p14:creationId xmlns:p14="http://schemas.microsoft.com/office/powerpoint/2010/main" val="1526262598"/>
+      </p:ext>
+    </p:extLst>
+  </p:cSld>
+  <p:clrMapOvr>
+    <a:masterClrMapping/>
+  </p:clrMapOvr>
+</p:sld>
+</file>
+
+<file path=ppt/slides/slide12.xml><?xml version="1.0" encoding="utf-8"?>
+<p:sld xmlns:a="http://schemas.openxmlformats.org/drawingml/2006/main" xmlns:r="http://schemas.openxmlformats.org/officeDocument/2006/relationships" xmlns:p="http://schemas.openxmlformats.org/presentationml/2006/main">
+  <p:cSld>
+    <p:spTree>
+      <p:nvGrpSpPr>
+        <p:cNvPr id="1" name="Shape 45"/>
+        <p:cNvGrpSpPr/>
+        <p:nvPr/>
+      </p:nvGrpSpPr>
+      <p:grpSpPr>
+        <a:xfrm>
+          <a:off x="0" y="0"/>
+          <a:ext cx="0" cy="0"/>
+          <a:chOff x="0" y="0"/>
+          <a:chExt cx="0" cy="0"/>
+        </a:xfrm>
+      </p:grpSpPr>
+      <p:pic>
+        <p:nvPicPr>
+          <p:cNvPr id="3" name="Picture 2">
+            <a:extLst>
+              <a:ext uri="{FF2B5EF4-FFF2-40B4-BE49-F238E27FC236}">
+                <a16:creationId xmlns:a16="http://schemas.microsoft.com/office/drawing/2014/main" id="{B7510C94-345A-254B-8E22-19B69B0DAB59}"/>
+              </a:ext>
+            </a:extLst>
+          </p:cNvPr>
+          <p:cNvPicPr>
+            <a:picLocks noChangeAspect="1"/>
+          </p:cNvPicPr>
+          <p:nvPr/>
+        </p:nvPicPr>
+        <p:blipFill>
+          <a:blip r:embed="rId3"/>
+          <a:stretch>
+            <a:fillRect/>
+          </a:stretch>
+        </p:blipFill>
+        <p:spPr>
+          <a:xfrm>
+            <a:off x="587500" y="955410"/>
+            <a:ext cx="7968997" cy="5179848"/>
+          </a:xfrm>
+          <a:prstGeom prst="rect">
+            <a:avLst/>
+          </a:prstGeom>
+        </p:spPr>
+      </p:pic>
+      <p:sp>
+        <p:nvSpPr>
+          <p:cNvPr id="4" name="TextBox 3">
+            <a:extLst>
+              <a:ext uri="{FF2B5EF4-FFF2-40B4-BE49-F238E27FC236}">
+                <a16:creationId xmlns:a16="http://schemas.microsoft.com/office/drawing/2014/main" id="{41682220-8212-854B-B21D-855E4F5D77F6}"/>
+              </a:ext>
+            </a:extLst>
+          </p:cNvPr>
+          <p:cNvSpPr txBox="1"/>
+          <p:nvPr/>
+        </p:nvSpPr>
+        <p:spPr>
+          <a:xfrm>
+            <a:off x="2260518" y="204916"/>
+            <a:ext cx="4365298" cy="646331"/>
+          </a:xfrm>
+          <a:prstGeom prst="rect">
+            <a:avLst/>
+          </a:prstGeom>
+          <a:noFill/>
+        </p:spPr>
+        <p:txBody>
+          <a:bodyPr wrap="none" rtlCol="0">
+            <a:spAutoFit/>
+          </a:bodyPr>
+          <a:lstStyle/>
+          <a:p>
+            <a:r>
+              <a:rPr lang="en-US" sz="3600" b="1" dirty="0">
+                <a:solidFill>
+                  <a:schemeClr val="bg1"/>
+                </a:solidFill>
+              </a:rPr>
+              <a:t>Model Architecture</a:t>
+            </a:r>
+          </a:p>
+        </p:txBody>
+      </p:sp>
+      <p:sp>
+        <p:nvSpPr>
+          <p:cNvPr id="6" name="TextBox 5">
+            <a:extLst>
+              <a:ext uri="{FF2B5EF4-FFF2-40B4-BE49-F238E27FC236}">
+                <a16:creationId xmlns:a16="http://schemas.microsoft.com/office/drawing/2014/main" id="{86965048-EA6E-4744-AC27-2C3BD66F8275}"/>
+              </a:ext>
+            </a:extLst>
+          </p:cNvPr>
+          <p:cNvSpPr txBox="1"/>
+          <p:nvPr/>
+        </p:nvSpPr>
+        <p:spPr>
+          <a:xfrm>
+            <a:off x="1585654" y="6345307"/>
+            <a:ext cx="5715026" cy="307777"/>
+          </a:xfrm>
+          <a:prstGeom prst="rect">
+            <a:avLst/>
+          </a:prstGeom>
+          <a:noFill/>
+        </p:spPr>
+        <p:txBody>
+          <a:bodyPr wrap="none" rtlCol="0">
+            <a:spAutoFit/>
+          </a:bodyPr>
+          <a:lstStyle/>
+          <a:p>
+            <a:r>
+              <a:rPr lang="en-IN" dirty="0">
+                <a:hlinkClick r:id="rId4"/>
+              </a:rPr>
+              <a:t>https://www.pyimagesearch.com/2018/09/24/opencv-face-recognition/</a:t>
+            </a:r>
+            <a:endParaRPr lang="en-US" dirty="0"/>
+          </a:p>
+        </p:txBody>
+      </p:sp>
+    </p:spTree>
+    <p:extLst>
+      <p:ext uri="{BB962C8B-B14F-4D97-AF65-F5344CB8AC3E}">
+        <p14:creationId xmlns:p14="http://schemas.microsoft.com/office/powerpoint/2010/main" val="2985859693"/>
       </p:ext>
     </p:extLst>
   </p:cSld>
@@ -4935,6 +5638,510 @@
 </file>
 
 <file path=ppt/slides/slide3.xml><?xml version="1.0" encoding="utf-8"?>
+<p:sld xmlns:a="http://schemas.openxmlformats.org/drawingml/2006/main" xmlns:r="http://schemas.openxmlformats.org/officeDocument/2006/relationships" xmlns:p="http://schemas.openxmlformats.org/presentationml/2006/main">
+  <p:cSld>
+    <p:spTree>
+      <p:nvGrpSpPr>
+        <p:cNvPr id="1" name="Shape 26"/>
+        <p:cNvGrpSpPr/>
+        <p:nvPr/>
+      </p:nvGrpSpPr>
+      <p:grpSpPr>
+        <a:xfrm>
+          <a:off x="0" y="0"/>
+          <a:ext cx="0" cy="0"/>
+          <a:chOff x="0" y="0"/>
+          <a:chExt cx="0" cy="0"/>
+        </a:xfrm>
+      </p:grpSpPr>
+      <p:sp>
+        <p:nvSpPr>
+          <p:cNvPr id="27" name="Shape 27"/>
+          <p:cNvSpPr txBox="1">
+            <a:spLocks noGrp="1"/>
+          </p:cNvSpPr>
+          <p:nvPr>
+            <p:ph type="ctrTitle"/>
+          </p:nvPr>
+        </p:nvSpPr>
+        <p:spPr>
+          <a:xfrm>
+            <a:off x="1650781" y="735724"/>
+            <a:ext cx="5842437" cy="859767"/>
+          </a:xfrm>
+          <a:prstGeom prst="rect">
+            <a:avLst/>
+          </a:prstGeom>
+        </p:spPr>
+        <p:txBody>
+          <a:bodyPr lIns="91425" tIns="91425" rIns="91425" bIns="91425" anchor="b" anchorCtr="0">
+            <a:noAutofit/>
+          </a:bodyPr>
+          <a:lstStyle/>
+          <a:p>
+            <a:pPr lvl="0" rtl="0">
+              <a:lnSpc>
+                <a:spcPct val="150000"/>
+              </a:lnSpc>
+              <a:spcBef>
+                <a:spcPts val="0"/>
+              </a:spcBef>
+              <a:buNone/>
+            </a:pPr>
+            <a:r>
+              <a:rPr lang="en-US" sz="4000" dirty="0"/>
+              <a:t>Team 6 Composition</a:t>
+            </a:r>
+            <a:endParaRPr lang="en" sz="2800" dirty="0"/>
+          </a:p>
+        </p:txBody>
+      </p:sp>
+      <p:graphicFrame>
+        <p:nvGraphicFramePr>
+          <p:cNvPr id="2" name="Table 1">
+            <a:extLst>
+              <a:ext uri="{FF2B5EF4-FFF2-40B4-BE49-F238E27FC236}">
+                <a16:creationId xmlns:a16="http://schemas.microsoft.com/office/drawing/2014/main" id="{243970A9-2376-CC4B-B04F-EA0922546645}"/>
+              </a:ext>
+            </a:extLst>
+          </p:cNvPr>
+          <p:cNvGraphicFramePr>
+            <a:graphicFrameLocks noGrp="1"/>
+          </p:cNvGraphicFramePr>
+          <p:nvPr>
+            <p:extLst>
+              <p:ext uri="{D42A27DB-BD31-4B8C-83A1-F6EECF244321}">
+                <p14:modId xmlns:p14="http://schemas.microsoft.com/office/powerpoint/2010/main" val="1725959859"/>
+              </p:ext>
+            </p:extLst>
+          </p:nvPr>
+        </p:nvGraphicFramePr>
+        <p:xfrm>
+          <a:off x="767254" y="1994661"/>
+          <a:ext cx="7609491" cy="4127615"/>
+        </p:xfrm>
+        <a:graphic>
+          <a:graphicData uri="http://schemas.openxmlformats.org/drawingml/2006/table">
+            <a:tbl>
+              <a:tblPr firstRow="1" bandRow="1">
+                <a:tableStyleId>{073A0DAA-6AF3-43AB-8588-CEC1D06C72B9}</a:tableStyleId>
+              </a:tblPr>
+              <a:tblGrid>
+                <a:gridCol w="2717675">
+                  <a:extLst>
+                    <a:ext uri="{9D8B030D-6E8A-4147-A177-3AD203B41FA5}">
+                      <a16:colId xmlns:a16="http://schemas.microsoft.com/office/drawing/2014/main" val="1494075287"/>
+                    </a:ext>
+                  </a:extLst>
+                </a:gridCol>
+                <a:gridCol w="2520026">
+                  <a:extLst>
+                    <a:ext uri="{9D8B030D-6E8A-4147-A177-3AD203B41FA5}">
+                      <a16:colId xmlns:a16="http://schemas.microsoft.com/office/drawing/2014/main" val="3594221390"/>
+                    </a:ext>
+                  </a:extLst>
+                </a:gridCol>
+                <a:gridCol w="2371790">
+                  <a:extLst>
+                    <a:ext uri="{9D8B030D-6E8A-4147-A177-3AD203B41FA5}">
+                      <a16:colId xmlns:a16="http://schemas.microsoft.com/office/drawing/2014/main" val="2157779109"/>
+                    </a:ext>
+                  </a:extLst>
+                </a:gridCol>
+              </a:tblGrid>
+              <a:tr h="493649">
+                <a:tc>
+                  <a:txBody>
+                    <a:bodyPr/>
+                    <a:lstStyle/>
+                    <a:p>
+                      <a:r>
+                        <a:rPr lang="en-US" sz="1800" dirty="0"/>
+                        <a:t>Name</a:t>
+                      </a:r>
+                      <a:endParaRPr lang="en-US" sz="1800" b="0" dirty="0"/>
+                    </a:p>
+                  </a:txBody>
+                  <a:tcPr/>
+                </a:tc>
+                <a:tc>
+                  <a:txBody>
+                    <a:bodyPr/>
+                    <a:lstStyle/>
+                    <a:p>
+                      <a:r>
+                        <a:rPr lang="en-US" sz="1800" dirty="0"/>
+                        <a:t>Profession</a:t>
+                      </a:r>
+                    </a:p>
+                  </a:txBody>
+                  <a:tcPr/>
+                </a:tc>
+                <a:tc>
+                  <a:txBody>
+                    <a:bodyPr/>
+                    <a:lstStyle/>
+                    <a:p>
+                      <a:r>
+                        <a:rPr lang="en-US" sz="1800" dirty="0"/>
+                        <a:t>Info</a:t>
+                      </a:r>
+                    </a:p>
+                  </a:txBody>
+                  <a:tcPr/>
+                </a:tc>
+                <a:extLst>
+                  <a:ext uri="{0D108BD9-81ED-4DB2-BD59-A6C34878D82A}">
+                    <a16:rowId xmlns:a16="http://schemas.microsoft.com/office/drawing/2014/main" val="2897727517"/>
+                  </a:ext>
+                </a:extLst>
+              </a:tr>
+              <a:tr h="642130">
+                <a:tc>
+                  <a:txBody>
+                    <a:bodyPr/>
+                    <a:lstStyle/>
+                    <a:p>
+                      <a:r>
+                        <a:rPr lang="en-US" sz="1800" dirty="0"/>
+                        <a:t>Rita Anjana</a:t>
+                      </a:r>
+                    </a:p>
+                  </a:txBody>
+                  <a:tcPr/>
+                </a:tc>
+                <a:tc>
+                  <a:txBody>
+                    <a:bodyPr/>
+                    <a:lstStyle/>
+                    <a:p>
+                      <a:r>
+                        <a:rPr lang="en-US" sz="1800" dirty="0"/>
+                        <a:t>Working Professional</a:t>
+                      </a:r>
+                    </a:p>
+                  </a:txBody>
+                  <a:tcPr/>
+                </a:tc>
+                <a:tc>
+                  <a:txBody>
+                    <a:bodyPr/>
+                    <a:lstStyle/>
+                    <a:p>
+                      <a:r>
+                        <a:rPr lang="en-US" sz="1800" dirty="0"/>
+                        <a:t>Without disability</a:t>
+                      </a:r>
+                    </a:p>
+                  </a:txBody>
+                  <a:tcPr/>
+                </a:tc>
+                <a:extLst>
+                  <a:ext uri="{0D108BD9-81ED-4DB2-BD59-A6C34878D82A}">
+                    <a16:rowId xmlns:a16="http://schemas.microsoft.com/office/drawing/2014/main" val="1005317644"/>
+                  </a:ext>
+                </a:extLst>
+              </a:tr>
+              <a:tr h="642130">
+                <a:tc>
+                  <a:txBody>
+                    <a:bodyPr/>
+                    <a:lstStyle/>
+                    <a:p>
+                      <a:r>
+                        <a:rPr lang="en-US" sz="1800" dirty="0" err="1"/>
+                        <a:t>Sajal</a:t>
+                      </a:r>
+                      <a:r>
+                        <a:rPr lang="en-US" sz="1800" dirty="0"/>
+                        <a:t> Arora</a:t>
+                      </a:r>
+                    </a:p>
+                  </a:txBody>
+                  <a:tcPr/>
+                </a:tc>
+                <a:tc>
+                  <a:txBody>
+                    <a:bodyPr/>
+                    <a:lstStyle/>
+                    <a:p>
+                      <a:pPr marL="0" marR="0" lvl="0" indent="0" algn="l" defTabSz="914400" rtl="0" eaLnBrk="1" fontAlgn="auto" latinLnBrk="0" hangingPunct="1">
+                        <a:lnSpc>
+                          <a:spcPct val="100000"/>
+                        </a:lnSpc>
+                        <a:spcBef>
+                          <a:spcPts val="0"/>
+                        </a:spcBef>
+                        <a:spcAft>
+                          <a:spcPts val="0"/>
+                        </a:spcAft>
+                        <a:buClrTx/>
+                        <a:buSzTx/>
+                        <a:buFontTx/>
+                        <a:buNone/>
+                        <a:tabLst/>
+                        <a:defRPr/>
+                      </a:pPr>
+                      <a:r>
+                        <a:rPr lang="en-US" sz="1800" dirty="0"/>
+                        <a:t>Working Professional</a:t>
+                      </a:r>
+                    </a:p>
+                  </a:txBody>
+                  <a:tcPr/>
+                </a:tc>
+                <a:tc>
+                  <a:txBody>
+                    <a:bodyPr/>
+                    <a:lstStyle/>
+                    <a:p>
+                      <a:r>
+                        <a:rPr lang="en-US" sz="1800" dirty="0"/>
+                        <a:t>Low Vision</a:t>
+                      </a:r>
+                    </a:p>
+                  </a:txBody>
+                  <a:tcPr/>
+                </a:tc>
+                <a:extLst>
+                  <a:ext uri="{0D108BD9-81ED-4DB2-BD59-A6C34878D82A}">
+                    <a16:rowId xmlns:a16="http://schemas.microsoft.com/office/drawing/2014/main" val="714891767"/>
+                  </a:ext>
+                </a:extLst>
+              </a:tr>
+              <a:tr h="1002273">
+                <a:tc>
+                  <a:txBody>
+                    <a:bodyPr/>
+                    <a:lstStyle/>
+                    <a:p>
+                      <a:r>
+                        <a:rPr lang="en-US" sz="1800" dirty="0"/>
+                        <a:t>Sandeep </a:t>
+                      </a:r>
+                      <a:r>
+                        <a:rPr lang="en-US" sz="1800" dirty="0" err="1"/>
+                        <a:t>Kanabar</a:t>
+                      </a:r>
+                      <a:endParaRPr lang="en-US" sz="1800" dirty="0"/>
+                    </a:p>
+                  </a:txBody>
+                  <a:tcPr/>
+                </a:tc>
+                <a:tc>
+                  <a:txBody>
+                    <a:bodyPr/>
+                    <a:lstStyle/>
+                    <a:p>
+                      <a:pPr marL="0" marR="0" lvl="0" indent="0" algn="l" defTabSz="914400" rtl="0" eaLnBrk="1" fontAlgn="auto" latinLnBrk="0" hangingPunct="1">
+                        <a:lnSpc>
+                          <a:spcPct val="100000"/>
+                        </a:lnSpc>
+                        <a:spcBef>
+                          <a:spcPts val="0"/>
+                        </a:spcBef>
+                        <a:spcAft>
+                          <a:spcPts val="0"/>
+                        </a:spcAft>
+                        <a:buClrTx/>
+                        <a:buSzTx/>
+                        <a:buFontTx/>
+                        <a:buNone/>
+                        <a:tabLst/>
+                        <a:defRPr/>
+                      </a:pPr>
+                      <a:r>
+                        <a:rPr lang="en-US" sz="1800" dirty="0"/>
+                        <a:t>Working Professional</a:t>
+                      </a:r>
+                    </a:p>
+                  </a:txBody>
+                  <a:tcPr/>
+                </a:tc>
+                <a:tc>
+                  <a:txBody>
+                    <a:bodyPr/>
+                    <a:lstStyle/>
+                    <a:p>
+                      <a:r>
+                        <a:rPr lang="en-US" sz="1800" dirty="0"/>
+                        <a:t>Hearing impaired. Relies entirely on lip-reading</a:t>
+                      </a:r>
+                    </a:p>
+                  </a:txBody>
+                  <a:tcPr/>
+                </a:tc>
+                <a:extLst>
+                  <a:ext uri="{0D108BD9-81ED-4DB2-BD59-A6C34878D82A}">
+                    <a16:rowId xmlns:a16="http://schemas.microsoft.com/office/drawing/2014/main" val="1580163219"/>
+                  </a:ext>
+                </a:extLst>
+              </a:tr>
+              <a:tr h="705303">
+                <a:tc>
+                  <a:txBody>
+                    <a:bodyPr/>
+                    <a:lstStyle/>
+                    <a:p>
+                      <a:r>
+                        <a:rPr lang="en-US" sz="1800" dirty="0"/>
+                        <a:t>Nitish </a:t>
+                      </a:r>
+                      <a:r>
+                        <a:rPr lang="en-US" sz="1800" dirty="0" err="1"/>
+                        <a:t>Tuteja</a:t>
+                      </a:r>
+                      <a:endParaRPr lang="en-US" sz="1800" dirty="0"/>
+                    </a:p>
+                  </a:txBody>
+                  <a:tcPr/>
+                </a:tc>
+                <a:tc>
+                  <a:txBody>
+                    <a:bodyPr/>
+                    <a:lstStyle/>
+                    <a:p>
+                      <a:pPr marL="0" marR="0" lvl="0" indent="0" algn="l" defTabSz="914400" rtl="0" eaLnBrk="1" fontAlgn="auto" latinLnBrk="0" hangingPunct="1">
+                        <a:lnSpc>
+                          <a:spcPct val="100000"/>
+                        </a:lnSpc>
+                        <a:spcBef>
+                          <a:spcPts val="0"/>
+                        </a:spcBef>
+                        <a:spcAft>
+                          <a:spcPts val="0"/>
+                        </a:spcAft>
+                        <a:buClrTx/>
+                        <a:buSzTx/>
+                        <a:buFontTx/>
+                        <a:buNone/>
+                        <a:tabLst/>
+                        <a:defRPr/>
+                      </a:pPr>
+                      <a:r>
+                        <a:rPr lang="en-US" sz="1800" dirty="0"/>
+                        <a:t>Fresher</a:t>
+                      </a:r>
+                    </a:p>
+                  </a:txBody>
+                  <a:tcPr/>
+                </a:tc>
+                <a:tc>
+                  <a:txBody>
+                    <a:bodyPr/>
+                    <a:lstStyle/>
+                    <a:p>
+                      <a:pPr marL="0" marR="0" lvl="0" indent="0" algn="l" defTabSz="914400" rtl="0" eaLnBrk="1" fontAlgn="auto" latinLnBrk="0" hangingPunct="1">
+                        <a:lnSpc>
+                          <a:spcPct val="100000"/>
+                        </a:lnSpc>
+                        <a:spcBef>
+                          <a:spcPts val="0"/>
+                        </a:spcBef>
+                        <a:spcAft>
+                          <a:spcPts val="0"/>
+                        </a:spcAft>
+                        <a:buClrTx/>
+                        <a:buSzTx/>
+                        <a:buFontTx/>
+                        <a:buNone/>
+                        <a:tabLst/>
+                        <a:defRPr/>
+                      </a:pPr>
+                      <a:r>
+                        <a:rPr lang="en-US" sz="1800" dirty="0"/>
+                        <a:t>Low Vision</a:t>
+                      </a:r>
+                    </a:p>
+                    <a:p>
+                      <a:endParaRPr lang="en-US" sz="1800" dirty="0"/>
+                    </a:p>
+                  </a:txBody>
+                  <a:tcPr/>
+                </a:tc>
+                <a:extLst>
+                  <a:ext uri="{0D108BD9-81ED-4DB2-BD59-A6C34878D82A}">
+                    <a16:rowId xmlns:a16="http://schemas.microsoft.com/office/drawing/2014/main" val="1798920269"/>
+                  </a:ext>
+                </a:extLst>
+              </a:tr>
+              <a:tr h="642130">
+                <a:tc>
+                  <a:txBody>
+                    <a:bodyPr/>
+                    <a:lstStyle/>
+                    <a:p>
+                      <a:r>
+                        <a:rPr lang="en-US" sz="1800" dirty="0"/>
+                        <a:t>Venkat </a:t>
+                      </a:r>
+                      <a:r>
+                        <a:rPr lang="en-US" sz="1800" dirty="0" err="1"/>
+                        <a:t>Suprabath</a:t>
+                      </a:r>
+                      <a:r>
+                        <a:rPr lang="en-US" sz="1800" dirty="0"/>
+                        <a:t> </a:t>
+                      </a:r>
+                      <a:r>
+                        <a:rPr lang="en-US" sz="1800" dirty="0" err="1"/>
+                        <a:t>Bitra</a:t>
+                      </a:r>
+                      <a:endParaRPr lang="en-US" sz="1800" dirty="0"/>
+                    </a:p>
+                  </a:txBody>
+                  <a:tcPr/>
+                </a:tc>
+                <a:tc>
+                  <a:txBody>
+                    <a:bodyPr/>
+                    <a:lstStyle/>
+                    <a:p>
+                      <a:r>
+                        <a:rPr lang="en-US" sz="1800" dirty="0"/>
+                        <a:t>Student</a:t>
+                      </a:r>
+                    </a:p>
+                  </a:txBody>
+                  <a:tcPr/>
+                </a:tc>
+                <a:tc>
+                  <a:txBody>
+                    <a:bodyPr/>
+                    <a:lstStyle/>
+                    <a:p>
+                      <a:r>
+                        <a:rPr lang="en-US" sz="1800" dirty="0"/>
+                        <a:t>Without Disability</a:t>
+                      </a:r>
+                    </a:p>
+                  </a:txBody>
+                  <a:tcPr/>
+                </a:tc>
+                <a:extLst>
+                  <a:ext uri="{0D108BD9-81ED-4DB2-BD59-A6C34878D82A}">
+                    <a16:rowId xmlns:a16="http://schemas.microsoft.com/office/drawing/2014/main" val="3088463879"/>
+                  </a:ext>
+                </a:extLst>
+              </a:tr>
+            </a:tbl>
+          </a:graphicData>
+        </a:graphic>
+      </p:graphicFrame>
+    </p:spTree>
+    <p:extLst>
+      <p:ext uri="{BB962C8B-B14F-4D97-AF65-F5344CB8AC3E}">
+        <p14:creationId xmlns:p14="http://schemas.microsoft.com/office/powerpoint/2010/main" val="2498893772"/>
+      </p:ext>
+    </p:extLst>
+  </p:cSld>
+  <p:clrMapOvr>
+    <a:masterClrMapping/>
+  </p:clrMapOvr>
+</p:sld>
+</file>
+
+<file path=ppt/slides/slide4.xml><?xml version="1.0" encoding="utf-8"?>
 <p:sld xmlns:a="http://schemas.openxmlformats.org/drawingml/2006/main" xmlns:r="http://schemas.openxmlformats.org/officeDocument/2006/relationships" xmlns:p="http://schemas.openxmlformats.org/presentationml/2006/main">
   <p:cSld>
     <p:spTree>
@@ -5046,7 +6253,7 @@
 </p:sld>
 </file>
 
-<file path=ppt/slides/slide4.xml><?xml version="1.0" encoding="utf-8"?>
+<file path=ppt/slides/slide5.xml><?xml version="1.0" encoding="utf-8"?>
 <p:sld xmlns:a="http://schemas.openxmlformats.org/drawingml/2006/main" xmlns:r="http://schemas.openxmlformats.org/officeDocument/2006/relationships" xmlns:p="http://schemas.openxmlformats.org/presentationml/2006/main">
   <p:cSld>
     <p:spTree>
@@ -5075,8 +6282,8 @@
         </p:nvSpPr>
         <p:spPr>
           <a:xfrm>
-            <a:off x="457200" y="891251"/>
-            <a:ext cx="7888014" cy="4237797"/>
+            <a:off x="520260" y="628493"/>
+            <a:ext cx="7888014" cy="5467508"/>
           </a:xfrm>
           <a:prstGeom prst="rect">
             <a:avLst/>
@@ -5085,7 +6292,7 @@
         </p:spPr>
         <p:txBody>
           <a:bodyPr lIns="91425" tIns="91425" rIns="91425" bIns="91425" anchor="t" anchorCtr="0">
-            <a:normAutofit/>
+            <a:normAutofit fontScale="92500" lnSpcReduction="10000"/>
           </a:bodyPr>
           <a:lstStyle/>
           <a:p>
@@ -5105,8 +6312,16 @@
               <a:buNone/>
             </a:pPr>
             <a:r>
-              <a:rPr lang="en-US" sz="4000" dirty="0"/>
-              <a:t>What is privacy eye?</a:t>
+              <a:rPr lang="en-US" sz="4300" dirty="0"/>
+              <a:t>What is </a:t>
+            </a:r>
+            <a:r>
+              <a:rPr lang="en-US" sz="4300" b="1" dirty="0"/>
+              <a:t>PRIVACY EYE</a:t>
+            </a:r>
+            <a:r>
+              <a:rPr lang="en-US" sz="4300" dirty="0"/>
+              <a:t>?</a:t>
             </a:r>
           </a:p>
           <a:p>
@@ -5125,12 +6340,29 @@
             <a:endParaRPr lang="en-US" sz="2200" dirty="0"/>
           </a:p>
           <a:p>
-            <a:pPr lvl="1">
-              <a:buNone/>
+            <a:pPr marL="571500" lvl="1" indent="-571500">
+              <a:buFont typeface="Wingdings" pitchFamily="2" charset="2"/>
+              <a:buChar char="Ø"/>
             </a:pPr>
             <a:r>
               <a:rPr lang="en-US" sz="4000" dirty="0"/>
               <a:t>Empowers people with or without disabilities by giving them more control over their privacy.</a:t>
+            </a:r>
+          </a:p>
+          <a:p>
+            <a:pPr lvl="1">
+              <a:buNone/>
+            </a:pPr>
+            <a:endParaRPr lang="en-US" sz="4000" dirty="0"/>
+          </a:p>
+          <a:p>
+            <a:pPr marL="571500" lvl="1" indent="-571500">
+              <a:buFont typeface="Wingdings" pitchFamily="2" charset="2"/>
+              <a:buChar char="Ø"/>
+            </a:pPr>
+            <a:r>
+              <a:rPr lang="en-US" sz="4000" dirty="0"/>
+              <a:t>It gives people an EYE over their privacy and hence the name PRIVACY EYE.</a:t>
             </a:r>
             <a:endParaRPr lang="en-US" sz="4400" dirty="0"/>
           </a:p>
@@ -5149,7 +6381,7 @@
 </p:sld>
 </file>
 
-<file path=ppt/slides/slide5.xml><?xml version="1.0" encoding="utf-8"?>
+<file path=ppt/slides/slide6.xml><?xml version="1.0" encoding="utf-8"?>
 <p:sld xmlns:a="http://schemas.openxmlformats.org/drawingml/2006/main" xmlns:r="http://schemas.openxmlformats.org/officeDocument/2006/relationships" xmlns:p="http://schemas.openxmlformats.org/presentationml/2006/main">
   <p:cSld>
     <p:spTree>
@@ -5196,7 +6428,7 @@
               <a:buNone/>
             </a:pPr>
             <a:r>
-              <a:rPr lang="en-US" sz="4000" dirty="0"/>
+              <a:rPr lang="en-US" sz="4400" dirty="0"/>
               <a:t>Why the need for privacy?</a:t>
             </a:r>
           </a:p>
@@ -5231,7 +6463,7 @@
 </p:sld>
 </file>
 
-<file path=ppt/slides/slide6.xml><?xml version="1.0" encoding="utf-8"?>
+<file path=ppt/slides/slide7.xml><?xml version="1.0" encoding="utf-8"?>
 <p:sld xmlns:a="http://schemas.openxmlformats.org/drawingml/2006/main" xmlns:r="http://schemas.openxmlformats.org/officeDocument/2006/relationships" xmlns:p="http://schemas.openxmlformats.org/presentationml/2006/main">
   <p:cSld>
     <p:spTree>
@@ -5260,7 +6492,7 @@
         </p:nvSpPr>
         <p:spPr>
           <a:xfrm>
-            <a:off x="1022131" y="123997"/>
+            <a:off x="1274372" y="250117"/>
             <a:ext cx="6314090" cy="832446"/>
           </a:xfrm>
           <a:prstGeom prst="rect">
@@ -5270,15 +6502,15 @@
         </p:spPr>
         <p:txBody>
           <a:bodyPr lIns="91425" tIns="91425" rIns="91425" bIns="91425" anchor="t" anchorCtr="0">
-            <a:normAutofit/>
+            <a:noAutofit/>
           </a:bodyPr>
           <a:lstStyle/>
           <a:p>
-            <a:pPr>
+            <a:pPr algn="ctr">
               <a:buNone/>
             </a:pPr>
             <a:r>
-              <a:rPr lang="en-US" sz="4000" dirty="0"/>
+              <a:rPr lang="en-US" sz="4400" dirty="0"/>
               <a:t>The need for privacy</a:t>
             </a:r>
           </a:p>
@@ -5300,8 +6532,8 @@
         </p:nvSpPr>
         <p:spPr>
           <a:xfrm>
-            <a:off x="457200" y="891251"/>
-            <a:ext cx="8229600" cy="5676650"/>
+            <a:off x="457200" y="1324302"/>
+            <a:ext cx="8229600" cy="5055477"/>
           </a:xfrm>
           <a:prstGeom prst="rect">
             <a:avLst/>
@@ -5562,13 +6794,6 @@
               </a:defRPr>
             </a:lvl9pPr>
           </a:lstStyle>
-          <a:p>
-            <a:pPr>
-              <a:buFont typeface="Arial"/>
-              <a:buNone/>
-            </a:pPr>
-            <a:endParaRPr lang="en-US" sz="2800" dirty="0"/>
-          </a:p>
           <a:p>
             <a:pPr marL="457200" indent="-457200">
               <a:buFont typeface="Wingdings" pitchFamily="2" charset="2"/>
@@ -5670,7 +6895,7 @@
 </p:sld>
 </file>
 
-<file path=ppt/slides/slide7.xml><?xml version="1.0" encoding="utf-8"?>
+<file path=ppt/slides/slide8.xml><?xml version="1.0" encoding="utf-8"?>
 <p:sld xmlns:a="http://schemas.openxmlformats.org/drawingml/2006/main" xmlns:r="http://schemas.openxmlformats.org/officeDocument/2006/relationships" xmlns:p="http://schemas.openxmlformats.org/presentationml/2006/main">
   <p:cSld>
     <p:spTree>
@@ -5699,8 +6924,8 @@
         </p:nvSpPr>
         <p:spPr>
           <a:xfrm>
-            <a:off x="1022131" y="123997"/>
-            <a:ext cx="6314090" cy="832446"/>
+            <a:off x="499240" y="554920"/>
+            <a:ext cx="8192811" cy="832446"/>
           </a:xfrm>
           <a:prstGeom prst="rect">
             <a:avLst/>
@@ -5709,7 +6934,7 @@
         </p:spPr>
         <p:txBody>
           <a:bodyPr lIns="91425" tIns="91425" rIns="91425" bIns="91425" anchor="t" anchorCtr="0">
-            <a:normAutofit fontScale="85000" lnSpcReduction="10000"/>
+            <a:noAutofit/>
           </a:bodyPr>
           <a:lstStyle/>
           <a:p>
@@ -5717,8 +6942,8 @@
               <a:buNone/>
             </a:pPr>
             <a:r>
-              <a:rPr lang="en-US" sz="4000" dirty="0"/>
-              <a:t>How are we detecting intrusion</a:t>
+              <a:rPr lang="en-US" sz="4400" dirty="0"/>
+              <a:t>How are we detecting intrusion?</a:t>
             </a:r>
           </a:p>
         </p:txBody>
@@ -5739,8 +6964,8 @@
         </p:nvSpPr>
         <p:spPr>
           <a:xfrm>
-            <a:off x="457200" y="891251"/>
-            <a:ext cx="8229600" cy="5676650"/>
+            <a:off x="462451" y="1942285"/>
+            <a:ext cx="8229600" cy="4101163"/>
           </a:xfrm>
           <a:prstGeom prst="rect">
             <a:avLst/>
@@ -6002,43 +7227,24 @@
             </a:lvl9pPr>
           </a:lstStyle>
           <a:p>
-            <a:pPr>
-              <a:buFont typeface="Arial"/>
-              <a:buNone/>
-            </a:pPr>
-            <a:endParaRPr lang="en-US" sz="3600" dirty="0"/>
-          </a:p>
-          <a:p>
             <a:pPr marL="457200" indent="-457200">
               <a:buFont typeface="Wingdings" pitchFamily="2" charset="2"/>
               <a:buChar char="Ø"/>
             </a:pPr>
             <a:r>
-              <a:rPr lang="en-US" sz="3600" dirty="0"/>
-              <a:t>Using OpenCV: Open Source Computer Vision Library - </a:t>
+              <a:rPr lang="en-US" sz="3200" dirty="0"/>
+              <a:t>Using OpenCV: </a:t>
             </a:r>
             <a:r>
-              <a:rPr lang="en-IN" sz="3600" dirty="0">
+              <a:rPr lang="en-IN" sz="3200" dirty="0">
                 <a:hlinkClick r:id="rId3"/>
               </a:rPr>
               <a:t>https://github.com/opencv/opencv</a:t>
             </a:r>
             <a:r>
-              <a:rPr lang="en-IN" sz="3600" dirty="0"/>
-              <a:t> for Face Detection and then Face Recognition to classify if face is intrusion or not. </a:t>
+              <a:rPr lang="en-IN" sz="3200" dirty="0"/>
+              <a:t>          for Face Detection and then Face Recognition to classify if face is intrusion or not. </a:t>
             </a:r>
-          </a:p>
-          <a:p>
-            <a:pPr>
-              <a:buNone/>
-            </a:pPr>
-            <a:endParaRPr lang="en-US" sz="3600" dirty="0"/>
-          </a:p>
-          <a:p>
-            <a:pPr>
-              <a:buNone/>
-            </a:pPr>
-            <a:endParaRPr lang="en-US" sz="3600" dirty="0"/>
           </a:p>
         </p:txBody>
       </p:sp>
@@ -6055,7 +7261,7 @@
 </p:sld>
 </file>
 
-<file path=ppt/slides/slide8.xml><?xml version="1.0" encoding="utf-8"?>
+<file path=ppt/slides/slide9.xml><?xml version="1.0" encoding="utf-8"?>
 <p:sld xmlns:a="http://schemas.openxmlformats.org/drawingml/2006/main" xmlns:r="http://schemas.openxmlformats.org/officeDocument/2006/relationships" xmlns:p="http://schemas.openxmlformats.org/presentationml/2006/main">
   <p:cSld>
     <p:spTree>
@@ -6590,372 +7796,6 @@
     <p:extLst>
       <p:ext uri="{BB962C8B-B14F-4D97-AF65-F5344CB8AC3E}">
         <p14:creationId xmlns:p14="http://schemas.microsoft.com/office/powerpoint/2010/main" val="2761718314"/>
-      </p:ext>
-    </p:extLst>
-  </p:cSld>
-  <p:clrMapOvr>
-    <a:masterClrMapping/>
-  </p:clrMapOvr>
-</p:sld>
-</file>
-
-<file path=ppt/slides/slide9.xml><?xml version="1.0" encoding="utf-8"?>
-<p:sld xmlns:a="http://schemas.openxmlformats.org/drawingml/2006/main" xmlns:r="http://schemas.openxmlformats.org/officeDocument/2006/relationships" xmlns:p="http://schemas.openxmlformats.org/presentationml/2006/main">
-  <p:cSld>
-    <p:spTree>
-      <p:nvGrpSpPr>
-        <p:cNvPr id="1" name="Shape 45"/>
-        <p:cNvGrpSpPr/>
-        <p:nvPr/>
-      </p:nvGrpSpPr>
-      <p:grpSpPr>
-        <a:xfrm>
-          <a:off x="0" y="0"/>
-          <a:ext cx="0" cy="0"/>
-          <a:chOff x="0" y="0"/>
-          <a:chExt cx="0" cy="0"/>
-        </a:xfrm>
-      </p:grpSpPr>
-      <p:sp>
-        <p:nvSpPr>
-          <p:cNvPr id="7" name="Shape 47">
-            <a:extLst>
-              <a:ext uri="{FF2B5EF4-FFF2-40B4-BE49-F238E27FC236}">
-                <a16:creationId xmlns:a16="http://schemas.microsoft.com/office/drawing/2014/main" id="{562FAEF3-33AD-F840-9F7F-A5E52FA0E812}"/>
-              </a:ext>
-            </a:extLst>
-          </p:cNvPr>
-          <p:cNvSpPr txBox="1">
-            <a:spLocks/>
-          </p:cNvSpPr>
-          <p:nvPr/>
-        </p:nvSpPr>
-        <p:spPr>
-          <a:xfrm>
-            <a:off x="457200" y="891251"/>
-            <a:ext cx="8229600" cy="5676650"/>
-          </a:xfrm>
-          <a:prstGeom prst="rect">
-            <a:avLst/>
-          </a:prstGeom>
-          <a:noFill/>
-          <a:ln>
-            <a:noFill/>
-          </a:ln>
-        </p:spPr>
-        <p:txBody>
-          <a:bodyPr lIns="91425" tIns="91425" rIns="91425" bIns="91425" anchor="t" anchorCtr="0">
-            <a:normAutofit/>
-          </a:bodyPr>
-          <a:lstStyle>
-            <a:defPPr marR="0" lvl="0" algn="l" rtl="0">
-              <a:lnSpc>
-                <a:spcPct val="100000"/>
-              </a:lnSpc>
-              <a:spcBef>
-                <a:spcPts val="0"/>
-              </a:spcBef>
-              <a:spcAft>
-                <a:spcPts val="0"/>
-              </a:spcAft>
-            </a:defPPr>
-            <a:lvl1pPr marR="0" lvl="0" algn="l" rtl="0">
-              <a:lnSpc>
-                <a:spcPct val="100000"/>
-              </a:lnSpc>
-              <a:spcBef>
-                <a:spcPts val="0"/>
-              </a:spcBef>
-              <a:spcAft>
-                <a:spcPts val="0"/>
-              </a:spcAft>
-              <a:buClr>
-                <a:schemeClr val="lt1"/>
-              </a:buClr>
-              <a:buSzPct val="100000"/>
-              <a:buFont typeface="Arial"/>
-              <a:buChar char="●"/>
-              <a:defRPr sz="3000" b="0" i="0" u="none" strike="noStrike" cap="none">
-                <a:solidFill>
-                  <a:schemeClr val="lt1"/>
-                </a:solidFill>
-                <a:latin typeface="Arial"/>
-                <a:ea typeface="Arial"/>
-                <a:cs typeface="Arial"/>
-                <a:sym typeface="Arial"/>
-              </a:defRPr>
-            </a:lvl1pPr>
-            <a:lvl2pPr marR="0" lvl="1" algn="l" rtl="0">
-              <a:lnSpc>
-                <a:spcPct val="100000"/>
-              </a:lnSpc>
-              <a:spcBef>
-                <a:spcPts val="0"/>
-              </a:spcBef>
-              <a:spcAft>
-                <a:spcPts val="0"/>
-              </a:spcAft>
-              <a:buClr>
-                <a:schemeClr val="lt1"/>
-              </a:buClr>
-              <a:buSzPct val="100000"/>
-              <a:buFont typeface="Courier New"/>
-              <a:buChar char="o"/>
-              <a:defRPr sz="2400" b="0" i="0" u="none" strike="noStrike" cap="none">
-                <a:solidFill>
-                  <a:schemeClr val="lt1"/>
-                </a:solidFill>
-                <a:latin typeface="Arial"/>
-                <a:ea typeface="Arial"/>
-                <a:cs typeface="Arial"/>
-                <a:sym typeface="Arial"/>
-              </a:defRPr>
-            </a:lvl2pPr>
-            <a:lvl3pPr marR="0" lvl="2" algn="l" rtl="0">
-              <a:lnSpc>
-                <a:spcPct val="100000"/>
-              </a:lnSpc>
-              <a:spcBef>
-                <a:spcPts val="0"/>
-              </a:spcBef>
-              <a:spcAft>
-                <a:spcPts val="0"/>
-              </a:spcAft>
-              <a:buClr>
-                <a:schemeClr val="lt1"/>
-              </a:buClr>
-              <a:buSzPct val="100000"/>
-              <a:buFont typeface="Wingdings"/>
-              <a:buChar char="§"/>
-              <a:defRPr sz="2400" b="0" i="0" u="none" strike="noStrike" cap="none">
-                <a:solidFill>
-                  <a:schemeClr val="lt1"/>
-                </a:solidFill>
-                <a:latin typeface="Arial"/>
-                <a:ea typeface="Arial"/>
-                <a:cs typeface="Arial"/>
-                <a:sym typeface="Arial"/>
-              </a:defRPr>
-            </a:lvl3pPr>
-            <a:lvl4pPr marR="0" lvl="3" algn="l" rtl="0">
-              <a:lnSpc>
-                <a:spcPct val="100000"/>
-              </a:lnSpc>
-              <a:spcBef>
-                <a:spcPts val="0"/>
-              </a:spcBef>
-              <a:spcAft>
-                <a:spcPts val="0"/>
-              </a:spcAft>
-              <a:buClr>
-                <a:schemeClr val="lt1"/>
-              </a:buClr>
-              <a:buSzPct val="100000"/>
-              <a:buFont typeface="Arial"/>
-              <a:buChar char="●"/>
-              <a:defRPr sz="1800" b="0" i="0" u="none" strike="noStrike" cap="none">
-                <a:solidFill>
-                  <a:schemeClr val="lt1"/>
-                </a:solidFill>
-                <a:latin typeface="Arial"/>
-                <a:ea typeface="Arial"/>
-                <a:cs typeface="Arial"/>
-                <a:sym typeface="Arial"/>
-              </a:defRPr>
-            </a:lvl4pPr>
-            <a:lvl5pPr marR="0" lvl="4" algn="l" rtl="0">
-              <a:lnSpc>
-                <a:spcPct val="100000"/>
-              </a:lnSpc>
-              <a:spcBef>
-                <a:spcPts val="0"/>
-              </a:spcBef>
-              <a:spcAft>
-                <a:spcPts val="0"/>
-              </a:spcAft>
-              <a:buClr>
-                <a:schemeClr val="lt1"/>
-              </a:buClr>
-              <a:buSzPct val="100000"/>
-              <a:buFont typeface="Courier New"/>
-              <a:buChar char="o"/>
-              <a:defRPr sz="1800" b="0" i="0" u="none" strike="noStrike" cap="none">
-                <a:solidFill>
-                  <a:schemeClr val="lt1"/>
-                </a:solidFill>
-                <a:latin typeface="Arial"/>
-                <a:ea typeface="Arial"/>
-                <a:cs typeface="Arial"/>
-                <a:sym typeface="Arial"/>
-              </a:defRPr>
-            </a:lvl5pPr>
-            <a:lvl6pPr marR="0" lvl="5" algn="l" rtl="0">
-              <a:lnSpc>
-                <a:spcPct val="100000"/>
-              </a:lnSpc>
-              <a:spcBef>
-                <a:spcPts val="0"/>
-              </a:spcBef>
-              <a:spcAft>
-                <a:spcPts val="0"/>
-              </a:spcAft>
-              <a:buClr>
-                <a:schemeClr val="lt1"/>
-              </a:buClr>
-              <a:buSzPct val="100000"/>
-              <a:buFont typeface="Wingdings"/>
-              <a:buChar char="§"/>
-              <a:defRPr sz="1800" b="0" i="0" u="none" strike="noStrike" cap="none">
-                <a:solidFill>
-                  <a:schemeClr val="lt1"/>
-                </a:solidFill>
-                <a:latin typeface="Arial"/>
-                <a:ea typeface="Arial"/>
-                <a:cs typeface="Arial"/>
-                <a:sym typeface="Arial"/>
-              </a:defRPr>
-            </a:lvl6pPr>
-            <a:lvl7pPr marR="0" lvl="6" algn="l" rtl="0">
-              <a:lnSpc>
-                <a:spcPct val="100000"/>
-              </a:lnSpc>
-              <a:spcBef>
-                <a:spcPts val="0"/>
-              </a:spcBef>
-              <a:spcAft>
-                <a:spcPts val="0"/>
-              </a:spcAft>
-              <a:buClr>
-                <a:schemeClr val="lt1"/>
-              </a:buClr>
-              <a:buSzPct val="100000"/>
-              <a:buFont typeface="Arial"/>
-              <a:buChar char="●"/>
-              <a:defRPr sz="1800" b="0" i="0" u="none" strike="noStrike" cap="none">
-                <a:solidFill>
-                  <a:schemeClr val="lt1"/>
-                </a:solidFill>
-                <a:latin typeface="Arial"/>
-                <a:ea typeface="Arial"/>
-                <a:cs typeface="Arial"/>
-                <a:sym typeface="Arial"/>
-              </a:defRPr>
-            </a:lvl7pPr>
-            <a:lvl8pPr marR="0" lvl="7" algn="l" rtl="0">
-              <a:lnSpc>
-                <a:spcPct val="100000"/>
-              </a:lnSpc>
-              <a:spcBef>
-                <a:spcPts val="0"/>
-              </a:spcBef>
-              <a:spcAft>
-                <a:spcPts val="0"/>
-              </a:spcAft>
-              <a:buClr>
-                <a:schemeClr val="lt1"/>
-              </a:buClr>
-              <a:buSzPct val="100000"/>
-              <a:buFont typeface="Courier New"/>
-              <a:buChar char="o"/>
-              <a:defRPr sz="1800" b="0" i="0" u="none" strike="noStrike" cap="none">
-                <a:solidFill>
-                  <a:schemeClr val="lt1"/>
-                </a:solidFill>
-                <a:latin typeface="Arial"/>
-                <a:ea typeface="Arial"/>
-                <a:cs typeface="Arial"/>
-                <a:sym typeface="Arial"/>
-              </a:defRPr>
-            </a:lvl8pPr>
-            <a:lvl9pPr marR="0" lvl="8" algn="l" rtl="0">
-              <a:lnSpc>
-                <a:spcPct val="100000"/>
-              </a:lnSpc>
-              <a:spcBef>
-                <a:spcPts val="0"/>
-              </a:spcBef>
-              <a:spcAft>
-                <a:spcPts val="0"/>
-              </a:spcAft>
-              <a:buClr>
-                <a:schemeClr val="lt1"/>
-              </a:buClr>
-              <a:buSzPct val="100000"/>
-              <a:buFont typeface="Wingdings"/>
-              <a:buChar char="§"/>
-              <a:defRPr sz="1800" b="0" i="0" u="none" strike="noStrike" cap="none">
-                <a:solidFill>
-                  <a:schemeClr val="lt1"/>
-                </a:solidFill>
-                <a:latin typeface="Arial"/>
-                <a:ea typeface="Arial"/>
-                <a:cs typeface="Arial"/>
-                <a:sym typeface="Arial"/>
-              </a:defRPr>
-            </a:lvl9pPr>
-          </a:lstStyle>
-          <a:p>
-            <a:pPr>
-              <a:buNone/>
-            </a:pPr>
-            <a:endParaRPr lang="en-US" sz="2800" dirty="0"/>
-          </a:p>
-          <a:p>
-            <a:pPr marL="457200" indent="-457200">
-              <a:buFont typeface="Wingdings" pitchFamily="2" charset="2"/>
-              <a:buChar char="Ø"/>
-            </a:pPr>
-            <a:r>
-              <a:rPr lang="en-US" sz="2800" dirty="0"/>
-              <a:t>Face detection to identify if intrusion happened.</a:t>
-            </a:r>
-          </a:p>
-          <a:p>
-            <a:pPr marL="457200" indent="-457200">
-              <a:buFont typeface="Wingdings" pitchFamily="2" charset="2"/>
-              <a:buChar char="Ø"/>
-            </a:pPr>
-            <a:endParaRPr lang="en-US" sz="2800" dirty="0"/>
-          </a:p>
-          <a:p>
-            <a:pPr marL="457200" indent="-457200">
-              <a:buFont typeface="Wingdings" pitchFamily="2" charset="2"/>
-              <a:buChar char="Ø"/>
-            </a:pPr>
-            <a:r>
-              <a:rPr lang="en-US" sz="2800" dirty="0"/>
-              <a:t>Once Face is detected, then Face is recognized using machine learning models and then classified to see if it matches SIMILAR Faces. If a match is found, it does NOT Alert. </a:t>
-            </a:r>
-          </a:p>
-          <a:p>
-            <a:pPr marL="457200" indent="-457200">
-              <a:buFont typeface="Wingdings" pitchFamily="2" charset="2"/>
-              <a:buChar char="Ø"/>
-            </a:pPr>
-            <a:r>
-              <a:rPr lang="en-US" sz="2800" dirty="0"/>
-              <a:t>If match is NOT found, raises intrusion</a:t>
-            </a:r>
-          </a:p>
-          <a:p>
-            <a:pPr marL="457200" indent="-457200">
-              <a:buFont typeface="Wingdings" pitchFamily="2" charset="2"/>
-              <a:buChar char="Ø"/>
-            </a:pPr>
-            <a:endParaRPr lang="en-US" sz="2800" dirty="0"/>
-          </a:p>
-          <a:p>
-            <a:pPr>
-              <a:buNone/>
-            </a:pPr>
-            <a:endParaRPr lang="en-US" sz="2800" dirty="0"/>
-          </a:p>
-        </p:txBody>
-      </p:sp>
-    </p:spTree>
-    <p:extLst>
-      <p:ext uri="{BB962C8B-B14F-4D97-AF65-F5344CB8AC3E}">
-        <p14:creationId xmlns:p14="http://schemas.microsoft.com/office/powerpoint/2010/main" val="1037662198"/>
       </p:ext>
     </p:extLst>
   </p:cSld>

</xml_diff>